<commit_message>
Upd Readme and PPT
</commit_message>
<xml_diff>
--- a/PPT/PPT_intervy.pptx
+++ b/PPT/PPT_intervy.pptx
@@ -162,7 +162,7 @@
   <pc:docChgLst>
     <pc:chgData name="Daniel Garrido Prados" userId="1d43a53d85794cda" providerId="LiveId" clId="{4B4F09F9-7755-4003-9A3F-F316B6AABC2F}"/>
     <pc:docChg chg="undo custSel addSld delSld modSld">
-      <pc:chgData name="Daniel Garrido Prados" userId="1d43a53d85794cda" providerId="LiveId" clId="{4B4F09F9-7755-4003-9A3F-F316B6AABC2F}" dt="2025-03-04T09:21:07.063" v="299" actId="2696"/>
+      <pc:chgData name="Daniel Garrido Prados" userId="1d43a53d85794cda" providerId="LiveId" clId="{4B4F09F9-7755-4003-9A3F-F316B6AABC2F}" dt="2025-03-04T11:11:26.804" v="300"/>
       <pc:docMkLst>
         <pc:docMk/>
       </pc:docMkLst>
@@ -347,7 +347,7 @@
         </pc:sldMkLst>
       </pc:sldChg>
       <pc:sldChg chg="modSp add modTransition">
-        <pc:chgData name="Daniel Garrido Prados" userId="1d43a53d85794cda" providerId="LiveId" clId="{4B4F09F9-7755-4003-9A3F-F316B6AABC2F}" dt="2025-03-04T09:14:49.253" v="281"/>
+        <pc:chgData name="Daniel Garrido Prados" userId="1d43a53d85794cda" providerId="LiveId" clId="{4B4F09F9-7755-4003-9A3F-F316B6AABC2F}" dt="2025-03-04T11:11:26.804" v="300"/>
         <pc:sldMkLst>
           <pc:docMk/>
           <pc:sldMk cId="153390029" sldId="279"/>
@@ -4568,13 +4568,13 @@
   <p:clrMapOvr>
     <a:masterClrMapping/>
   </p:clrMapOvr>
-  <mc:AlternateContent xmlns:mc="http://schemas.openxmlformats.org/markup-compatibility/2006">
-    <mc:Choice xmlns:p14="http://schemas.microsoft.com/office/powerpoint/2010/main" Requires="p14">
+  <mc:AlternateContent xmlns:mc="http://schemas.openxmlformats.org/markup-compatibility/2006" xmlns:p14="http://schemas.microsoft.com/office/powerpoint/2010/main">
+    <mc:Choice Requires="p14">
       <p:transition spd="slow" p14:dur="1500">
         <p:split orient="vert"/>
       </p:transition>
     </mc:Choice>
-    <mc:Fallback>
+    <mc:Fallback xmlns="">
       <p:transition spd="slow">
         <p:split orient="vert"/>
       </p:transition>
@@ -5228,12 +5228,12 @@
   </p:clrMapOvr>
   <mc:AlternateContent xmlns:mc="http://schemas.openxmlformats.org/markup-compatibility/2006">
     <mc:Choice xmlns:p159="http://schemas.microsoft.com/office/powerpoint/2015/09/main" Requires="p159">
-      <p:transition xmlns:p14="http://schemas.microsoft.com/office/powerpoint/2010/main" spd="slow" p14:dur="2000" advClick="0" advTm="500">
+      <p:transition xmlns:p14="http://schemas.microsoft.com/office/powerpoint/2010/main" spd="slow" p14:dur="2000" advClick="0" advTm="0">
         <p159:morph option="byObject"/>
       </p:transition>
     </mc:Choice>
     <mc:Fallback>
-      <p:transition spd="slow" advClick="0" advTm="500">
+      <p:transition spd="slow" advClick="0" advTm="0">
         <p:fade/>
       </p:transition>
     </mc:Fallback>
@@ -5609,13 +5609,13 @@
   <p:clrMapOvr>
     <a:masterClrMapping/>
   </p:clrMapOvr>
-  <mc:AlternateContent xmlns:mc="http://schemas.openxmlformats.org/markup-compatibility/2006">
-    <mc:Choice xmlns:p14="http://schemas.microsoft.com/office/powerpoint/2010/main" Requires="p14">
+  <mc:AlternateContent xmlns:mc="http://schemas.openxmlformats.org/markup-compatibility/2006" xmlns:p14="http://schemas.microsoft.com/office/powerpoint/2010/main">
+    <mc:Choice Requires="p14">
       <p:transition spd="med" p14:dur="700">
         <p:fade/>
       </p:transition>
     </mc:Choice>
-    <mc:Fallback>
+    <mc:Fallback xmlns="">
       <p:transition spd="med">
         <p:fade/>
       </p:transition>
@@ -8136,13 +8136,13 @@
   <p:clrMapOvr>
     <a:masterClrMapping/>
   </p:clrMapOvr>
-  <mc:AlternateContent xmlns:mc="http://schemas.openxmlformats.org/markup-compatibility/2006">
-    <mc:Choice xmlns:p159="http://schemas.microsoft.com/office/powerpoint/2015/09/main" Requires="p159">
+  <mc:AlternateContent xmlns:mc="http://schemas.openxmlformats.org/markup-compatibility/2006" xmlns:p159="http://schemas.microsoft.com/office/powerpoint/2015/09/main">
+    <mc:Choice Requires="p159">
       <p:transition xmlns:p14="http://schemas.microsoft.com/office/powerpoint/2010/main" spd="slow" p14:dur="2000">
         <p159:morph option="byObject"/>
       </p:transition>
     </mc:Choice>
-    <mc:Fallback>
+    <mc:Fallback xmlns="">
       <p:transition spd="slow">
         <p:fade/>
       </p:transition>
@@ -8561,13 +8561,13 @@
   <p:clrMapOvr>
     <a:masterClrMapping/>
   </p:clrMapOvr>
-  <mc:AlternateContent xmlns:mc="http://schemas.openxmlformats.org/markup-compatibility/2006">
-    <mc:Choice xmlns:p159="http://schemas.microsoft.com/office/powerpoint/2015/09/main" Requires="p159">
+  <mc:AlternateContent xmlns:mc="http://schemas.openxmlformats.org/markup-compatibility/2006" xmlns:p159="http://schemas.microsoft.com/office/powerpoint/2015/09/main">
+    <mc:Choice Requires="p159">
       <p:transition xmlns:p14="http://schemas.microsoft.com/office/powerpoint/2010/main" spd="slow" p14:dur="2000">
         <p159:morph option="byObject"/>
       </p:transition>
     </mc:Choice>
-    <mc:Fallback>
+    <mc:Fallback xmlns="">
       <p:transition spd="slow">
         <p:fade/>
       </p:transition>

</xml_diff>